<commit_message>
adiciona mais imagens do projeto e realiza alterações no arquivo pptx
</commit_message>
<xml_diff>
--- a/cyclistic_apresentacao.pptx
+++ b/cyclistic_apresentacao.pptx
@@ -215,7 +215,7 @@
           <a:p>
             <a:fld id="{8401DE40-AAA9-4872-8FC6-A2E4781D92FA}" type="datetimeFigureOut">
               <a:rPr lang="pt-BR" smtClean="0"/>
-              <a:t>16/10/2023</a:t>
+              <a:t>17/10/2023</a:t>
             </a:fld>
             <a:endParaRPr lang="pt-BR"/>
           </a:p>
@@ -1049,7 +1049,7 @@
           <a:p>
             <a:fld id="{D8D3A64A-4F34-4761-AAFF-2F83893BE3AA}" type="datetimeFigureOut">
               <a:rPr lang="pt-BR" smtClean="0"/>
-              <a:t>16/10/2023</a:t>
+              <a:t>17/10/2023</a:t>
             </a:fld>
             <a:endParaRPr lang="pt-BR"/>
           </a:p>
@@ -1247,7 +1247,7 @@
           <a:p>
             <a:fld id="{D8D3A64A-4F34-4761-AAFF-2F83893BE3AA}" type="datetimeFigureOut">
               <a:rPr lang="pt-BR" smtClean="0"/>
-              <a:t>16/10/2023</a:t>
+              <a:t>17/10/2023</a:t>
             </a:fld>
             <a:endParaRPr lang="pt-BR"/>
           </a:p>
@@ -1455,7 +1455,7 @@
           <a:p>
             <a:fld id="{D8D3A64A-4F34-4761-AAFF-2F83893BE3AA}" type="datetimeFigureOut">
               <a:rPr lang="pt-BR" smtClean="0"/>
-              <a:t>16/10/2023</a:t>
+              <a:t>17/10/2023</a:t>
             </a:fld>
             <a:endParaRPr lang="pt-BR"/>
           </a:p>
@@ -1653,7 +1653,7 @@
           <a:p>
             <a:fld id="{D8D3A64A-4F34-4761-AAFF-2F83893BE3AA}" type="datetimeFigureOut">
               <a:rPr lang="pt-BR" smtClean="0"/>
-              <a:t>16/10/2023</a:t>
+              <a:t>17/10/2023</a:t>
             </a:fld>
             <a:endParaRPr lang="pt-BR"/>
           </a:p>
@@ -1928,7 +1928,7 @@
           <a:p>
             <a:fld id="{D8D3A64A-4F34-4761-AAFF-2F83893BE3AA}" type="datetimeFigureOut">
               <a:rPr lang="pt-BR" smtClean="0"/>
-              <a:t>16/10/2023</a:t>
+              <a:t>17/10/2023</a:t>
             </a:fld>
             <a:endParaRPr lang="pt-BR"/>
           </a:p>
@@ -2193,7 +2193,7 @@
           <a:p>
             <a:fld id="{D8D3A64A-4F34-4761-AAFF-2F83893BE3AA}" type="datetimeFigureOut">
               <a:rPr lang="pt-BR" smtClean="0"/>
-              <a:t>16/10/2023</a:t>
+              <a:t>17/10/2023</a:t>
             </a:fld>
             <a:endParaRPr lang="pt-BR"/>
           </a:p>
@@ -2605,7 +2605,7 @@
           <a:p>
             <a:fld id="{D8D3A64A-4F34-4761-AAFF-2F83893BE3AA}" type="datetimeFigureOut">
               <a:rPr lang="pt-BR" smtClean="0"/>
-              <a:t>16/10/2023</a:t>
+              <a:t>17/10/2023</a:t>
             </a:fld>
             <a:endParaRPr lang="pt-BR"/>
           </a:p>
@@ -2746,7 +2746,7 @@
           <a:p>
             <a:fld id="{D8D3A64A-4F34-4761-AAFF-2F83893BE3AA}" type="datetimeFigureOut">
               <a:rPr lang="pt-BR" smtClean="0"/>
-              <a:t>16/10/2023</a:t>
+              <a:t>17/10/2023</a:t>
             </a:fld>
             <a:endParaRPr lang="pt-BR"/>
           </a:p>
@@ -2859,7 +2859,7 @@
           <a:p>
             <a:fld id="{D8D3A64A-4F34-4761-AAFF-2F83893BE3AA}" type="datetimeFigureOut">
               <a:rPr lang="pt-BR" smtClean="0"/>
-              <a:t>16/10/2023</a:t>
+              <a:t>17/10/2023</a:t>
             </a:fld>
             <a:endParaRPr lang="pt-BR"/>
           </a:p>
@@ -3170,7 +3170,7 @@
           <a:p>
             <a:fld id="{D8D3A64A-4F34-4761-AAFF-2F83893BE3AA}" type="datetimeFigureOut">
               <a:rPr lang="pt-BR" smtClean="0"/>
-              <a:t>16/10/2023</a:t>
+              <a:t>17/10/2023</a:t>
             </a:fld>
             <a:endParaRPr lang="pt-BR"/>
           </a:p>
@@ -3458,7 +3458,7 @@
           <a:p>
             <a:fld id="{D8D3A64A-4F34-4761-AAFF-2F83893BE3AA}" type="datetimeFigureOut">
               <a:rPr lang="pt-BR" smtClean="0"/>
-              <a:t>16/10/2023</a:t>
+              <a:t>17/10/2023</a:t>
             </a:fld>
             <a:endParaRPr lang="pt-BR"/>
           </a:p>
@@ -3702,7 +3702,7 @@
           <a:p>
             <a:fld id="{D8D3A64A-4F34-4761-AAFF-2F83893BE3AA}" type="datetimeFigureOut">
               <a:rPr lang="pt-BR" smtClean="0"/>
-              <a:t>16/10/2023</a:t>
+              <a:t>17/10/2023</a:t>
             </a:fld>
             <a:endParaRPr lang="pt-BR"/>
           </a:p>
@@ -4263,10 +4263,23 @@
                 <a:latin typeface="Biome" panose="020B0503030204020804" pitchFamily="34" charset="0"/>
                 <a:cs typeface="Biome" panose="020B0503030204020804" pitchFamily="34" charset="0"/>
               </a:rPr>
-              <a:t>Atualizado em:</a:t>
-            </a:r>
-            <a:r>
-              <a:rPr lang="pt-BR" b="1" dirty="0">
+              <a:t>Atualizado em</a:t>
+            </a:r>
+            <a:r>
+              <a:rPr lang="pt-BR" b="1">
+                <a:solidFill>
+                  <a:schemeClr val="tx1">
+                    <a:lumMod val="65000"/>
+                    <a:lumOff val="35000"/>
+                  </a:schemeClr>
+                </a:solidFill>
+                <a:latin typeface="Biome" panose="020B0503030204020804" pitchFamily="34" charset="0"/>
+                <a:cs typeface="Biome" panose="020B0503030204020804" pitchFamily="34" charset="0"/>
+              </a:rPr>
+              <a:t>:</a:t>
+            </a:r>
+            <a:r>
+              <a:rPr lang="pt-BR" b="1">
                 <a:solidFill>
                   <a:schemeClr val="tx1">
                     <a:lumMod val="50000"/>
@@ -4279,7 +4292,7 @@
               <a:t>  </a:t>
             </a:r>
             <a:r>
-              <a:rPr lang="pt-BR" dirty="0">
+              <a:rPr lang="pt-BR">
                 <a:solidFill>
                   <a:schemeClr val="tx1">
                     <a:lumMod val="50000"/>
@@ -4289,7 +4302,20 @@
                 <a:latin typeface="Biome" panose="020B0503030204020804" pitchFamily="34" charset="0"/>
                 <a:cs typeface="Biome" panose="020B0503030204020804" pitchFamily="34" charset="0"/>
               </a:rPr>
-              <a:t>16 de outubro de 2023</a:t>
+              <a:t>17 </a:t>
+            </a:r>
+            <a:r>
+              <a:rPr lang="pt-BR" dirty="0">
+                <a:solidFill>
+                  <a:schemeClr val="tx1">
+                    <a:lumMod val="50000"/>
+                    <a:lumOff val="50000"/>
+                  </a:schemeClr>
+                </a:solidFill>
+                <a:latin typeface="Biome" panose="020B0503030204020804" pitchFamily="34" charset="0"/>
+                <a:cs typeface="Biome" panose="020B0503030204020804" pitchFamily="34" charset="0"/>
+              </a:rPr>
+              <a:t>de outubro de 2023</a:t>
             </a:r>
           </a:p>
         </p:txBody>
@@ -8089,7 +8115,7 @@
                 <a:latin typeface="Biome" panose="020B0503030204020804" pitchFamily="34" charset="0"/>
                 <a:cs typeface="Biome" panose="020B0503030204020804" pitchFamily="34" charset="0"/>
               </a:rPr>
-              <a:t>Pode-se direcionar 2 targets de marketing diferentes: </a:t>
+              <a:t>Pode-se trabalhar sob 2 abordagens diferentes: </a:t>
             </a:r>
           </a:p>
           <a:p>

</xml_diff>